<commit_message>
Update the agenda deck
</commit_message>
<xml_diff>
--- a/Agenda Materials/onedm-agenda-2022-05-23.pptx
+++ b/Agenda Materials/onedm-agenda-2022-05-23.pptx
@@ -244,7 +244,7 @@
           <a:p>
             <a:fld id="{BA52C132-66A2-E345-8EBB-CCDD2AA78407}" type="datetimeFigureOut">
               <a:rPr lang="en-US" smtClean="0"/>
-              <a:t>5/22/22</a:t>
+              <a:t>5/23/22</a:t>
             </a:fld>
             <a:endParaRPr lang="en-US"/>
           </a:p>
@@ -642,7 +642,7 @@
           <a:p>
             <a:fld id="{D057EDBF-1783-6543-A668-FCF30E10D4FA}" type="datetimeFigureOut">
               <a:rPr lang="en-US" smtClean="0"/>
-              <a:t>5/22/22</a:t>
+              <a:t>5/23/22</a:t>
             </a:fld>
             <a:endParaRPr lang="en-US" dirty="0"/>
           </a:p>
@@ -1556,7 +1556,7 @@
           <a:p>
             <a:fld id="{D057EDBF-1783-6543-A668-FCF30E10D4FA}" type="datetimeFigureOut">
               <a:rPr lang="en-US" smtClean="0"/>
-              <a:t>5/22/22</a:t>
+              <a:t>5/23/22</a:t>
             </a:fld>
             <a:endParaRPr lang="en-US"/>
           </a:p>
@@ -1731,7 +1731,7 @@
           <a:p>
             <a:fld id="{D057EDBF-1783-6543-A668-FCF30E10D4FA}" type="datetimeFigureOut">
               <a:rPr lang="en-US" smtClean="0"/>
-              <a:t>5/22/22</a:t>
+              <a:t>5/23/22</a:t>
             </a:fld>
             <a:endParaRPr lang="en-US"/>
           </a:p>
@@ -1934,7 +1934,7 @@
           <a:p>
             <a:fld id="{908F779F-8F42-4393-AF9F-89DFA4BAC582}" type="datetimeFigureOut">
               <a:rPr lang="en-US" smtClean="0"/>
-              <a:t>5/22/22</a:t>
+              <a:t>5/23/22</a:t>
             </a:fld>
             <a:endParaRPr lang="en-US"/>
           </a:p>
@@ -2132,7 +2132,7 @@
           <a:p>
             <a:fld id="{908F779F-8F42-4393-AF9F-89DFA4BAC582}" type="datetimeFigureOut">
               <a:rPr lang="en-US" smtClean="0"/>
-              <a:t>5/22/22</a:t>
+              <a:t>5/23/22</a:t>
             </a:fld>
             <a:endParaRPr lang="en-US"/>
           </a:p>
@@ -2407,7 +2407,7 @@
           <a:p>
             <a:fld id="{908F779F-8F42-4393-AF9F-89DFA4BAC582}" type="datetimeFigureOut">
               <a:rPr lang="en-US" smtClean="0"/>
-              <a:t>5/22/22</a:t>
+              <a:t>5/23/22</a:t>
             </a:fld>
             <a:endParaRPr lang="en-US"/>
           </a:p>
@@ -2672,7 +2672,7 @@
           <a:p>
             <a:fld id="{908F779F-8F42-4393-AF9F-89DFA4BAC582}" type="datetimeFigureOut">
               <a:rPr lang="en-US" smtClean="0"/>
-              <a:t>5/22/22</a:t>
+              <a:t>5/23/22</a:t>
             </a:fld>
             <a:endParaRPr lang="en-US"/>
           </a:p>
@@ -3084,7 +3084,7 @@
           <a:p>
             <a:fld id="{908F779F-8F42-4393-AF9F-89DFA4BAC582}" type="datetimeFigureOut">
               <a:rPr lang="en-US" smtClean="0"/>
-              <a:t>5/22/22</a:t>
+              <a:t>5/23/22</a:t>
             </a:fld>
             <a:endParaRPr lang="en-US"/>
           </a:p>
@@ -3225,7 +3225,7 @@
           <a:p>
             <a:fld id="{908F779F-8F42-4393-AF9F-89DFA4BAC582}" type="datetimeFigureOut">
               <a:rPr lang="en-US" smtClean="0"/>
-              <a:t>5/22/22</a:t>
+              <a:t>5/23/22</a:t>
             </a:fld>
             <a:endParaRPr lang="en-US"/>
           </a:p>
@@ -3338,7 +3338,7 @@
           <a:p>
             <a:fld id="{908F779F-8F42-4393-AF9F-89DFA4BAC582}" type="datetimeFigureOut">
               <a:rPr lang="en-US" smtClean="0"/>
-              <a:t>5/22/22</a:t>
+              <a:t>5/23/22</a:t>
             </a:fld>
             <a:endParaRPr lang="en-US"/>
           </a:p>
@@ -3649,7 +3649,7 @@
           <a:p>
             <a:fld id="{908F779F-8F42-4393-AF9F-89DFA4BAC582}" type="datetimeFigureOut">
               <a:rPr lang="en-US" smtClean="0"/>
-              <a:t>5/22/22</a:t>
+              <a:t>5/23/22</a:t>
             </a:fld>
             <a:endParaRPr lang="en-US"/>
           </a:p>
@@ -3839,7 +3839,7 @@
           <a:p>
             <a:fld id="{D057EDBF-1783-6543-A668-FCF30E10D4FA}" type="datetimeFigureOut">
               <a:rPr lang="en-US" smtClean="0"/>
-              <a:t>5/22/22</a:t>
+              <a:t>5/23/22</a:t>
             </a:fld>
             <a:endParaRPr lang="en-US" dirty="0"/>
           </a:p>
@@ -4143,7 +4143,7 @@
           <a:p>
             <a:fld id="{908F779F-8F42-4393-AF9F-89DFA4BAC582}" type="datetimeFigureOut">
               <a:rPr lang="en-US" smtClean="0"/>
-              <a:t>5/22/22</a:t>
+              <a:t>5/23/22</a:t>
             </a:fld>
             <a:endParaRPr lang="en-US"/>
           </a:p>
@@ -4341,7 +4341,7 @@
           <a:p>
             <a:fld id="{908F779F-8F42-4393-AF9F-89DFA4BAC582}" type="datetimeFigureOut">
               <a:rPr lang="en-US" smtClean="0"/>
-              <a:t>5/22/22</a:t>
+              <a:t>5/23/22</a:t>
             </a:fld>
             <a:endParaRPr lang="en-US"/>
           </a:p>
@@ -4549,7 +4549,7 @@
           <a:p>
             <a:fld id="{908F779F-8F42-4393-AF9F-89DFA4BAC582}" type="datetimeFigureOut">
               <a:rPr lang="en-US" smtClean="0"/>
-              <a:t>5/22/22</a:t>
+              <a:t>5/23/22</a:t>
             </a:fld>
             <a:endParaRPr lang="en-US"/>
           </a:p>
@@ -4805,7 +4805,7 @@
           <a:p>
             <a:fld id="{D057EDBF-1783-6543-A668-FCF30E10D4FA}" type="datetimeFigureOut">
               <a:rPr lang="en-US" smtClean="0"/>
-              <a:t>5/22/22</a:t>
+              <a:t>5/23/22</a:t>
             </a:fld>
             <a:endParaRPr lang="en-US"/>
           </a:p>
@@ -5032,7 +5032,7 @@
           <a:p>
             <a:fld id="{D057EDBF-1783-6543-A668-FCF30E10D4FA}" type="datetimeFigureOut">
               <a:rPr lang="en-US" smtClean="0"/>
-              <a:t>5/22/22</a:t>
+              <a:t>5/23/22</a:t>
             </a:fld>
             <a:endParaRPr lang="en-US"/>
           </a:p>
@@ -5394,7 +5394,7 @@
           <a:p>
             <a:fld id="{D057EDBF-1783-6543-A668-FCF30E10D4FA}" type="datetimeFigureOut">
               <a:rPr lang="en-US" smtClean="0"/>
-              <a:t>5/22/22</a:t>
+              <a:t>5/23/22</a:t>
             </a:fld>
             <a:endParaRPr lang="en-US"/>
           </a:p>
@@ -5507,7 +5507,7 @@
           <a:p>
             <a:fld id="{D057EDBF-1783-6543-A668-FCF30E10D4FA}" type="datetimeFigureOut">
               <a:rPr lang="en-US" smtClean="0"/>
-              <a:t>5/22/22</a:t>
+              <a:t>5/23/22</a:t>
             </a:fld>
             <a:endParaRPr lang="en-US"/>
           </a:p>
@@ -5597,7 +5597,7 @@
           <a:p>
             <a:fld id="{D057EDBF-1783-6543-A668-FCF30E10D4FA}" type="datetimeFigureOut">
               <a:rPr lang="en-US" smtClean="0"/>
-              <a:t>5/22/22</a:t>
+              <a:t>5/23/22</a:t>
             </a:fld>
             <a:endParaRPr lang="en-US"/>
           </a:p>
@@ -5869,7 +5869,7 @@
           <a:p>
             <a:fld id="{D057EDBF-1783-6543-A668-FCF30E10D4FA}" type="datetimeFigureOut">
               <a:rPr lang="en-US" smtClean="0"/>
-              <a:t>5/22/22</a:t>
+              <a:t>5/23/22</a:t>
             </a:fld>
             <a:endParaRPr lang="en-US"/>
           </a:p>
@@ -6121,7 +6121,7 @@
           <a:p>
             <a:fld id="{D057EDBF-1783-6543-A668-FCF30E10D4FA}" type="datetimeFigureOut">
               <a:rPr lang="en-US" smtClean="0"/>
-              <a:t>5/22/22</a:t>
+              <a:t>5/23/22</a:t>
             </a:fld>
             <a:endParaRPr lang="en-US"/>
           </a:p>
@@ -6332,7 +6332,7 @@
           <a:p>
             <a:fld id="{D057EDBF-1783-6543-A668-FCF30E10D4FA}" type="datetimeFigureOut">
               <a:rPr lang="en-US" smtClean="0"/>
-              <a:t>5/22/22</a:t>
+              <a:t>5/23/22</a:t>
             </a:fld>
             <a:endParaRPr lang="en-US"/>
           </a:p>
@@ -6888,7 +6888,7 @@
           <a:p>
             <a:fld id="{908F779F-8F42-4393-AF9F-89DFA4BAC582}" type="datetimeFigureOut">
               <a:rPr lang="en-US" smtClean="0"/>
-              <a:t>5/22/22</a:t>
+              <a:t>5/23/22</a:t>
             </a:fld>
             <a:endParaRPr lang="en-US"/>
           </a:p>
@@ -9010,7 +9010,7 @@
           <a:p>
             <a:r>
               <a:rPr lang="en-US" dirty="0"/>
-              <a:t>Scott-Logan update</a:t>
+              <a:t>Scott-Morgan foundation update</a:t>
             </a:r>
           </a:p>
           <a:p>
@@ -14844,7 +14844,7 @@
             <a:pPr lvl="1"/>
             <a:r>
               <a:rPr lang="en-US" dirty="0"/>
-              <a:t>Feature of Interest for categories: Door, Window</a:t>
+              <a:t>Feature of Interest categories: Door, Window</a:t>
             </a:r>
           </a:p>
           <a:p>

</xml_diff>